<commit_message>
start fix 4 spline approach 2 and presentation
</commit_message>
<xml_diff>
--- a/Precise Positioning and Scanning for Microwave Imaging.pptx
+++ b/Precise Positioning and Scanning for Microwave Imaging.pptx
@@ -259,7 +259,7 @@
           <a:p>
             <a:fld id="{8998DC2E-BBE8-4220-8AF4-7CD51DC9547B}" type="datetimeFigureOut">
               <a:rPr lang="en-SE" smtClean="0"/>
-              <a:t>2022-12-07</a:t>
+              <a:t>12/08/2022</a:t>
             </a:fld>
             <a:endParaRPr lang="en-SE"/>
           </a:p>
@@ -437,7 +437,7 @@
           <a:p>
             <a:fld id="{77A1B909-AD3C-48D9-911C-1AAE0D92A42D}" type="datetimeFigureOut">
               <a:rPr lang="en-SE" smtClean="0"/>
-              <a:t>2022-12-07</a:t>
+              <a:t>12/08/2022</a:t>
             </a:fld>
             <a:endParaRPr lang="en-SE"/>
           </a:p>
@@ -855,7 +855,7 @@
           <a:p>
             <a:fld id="{5785ABCD-7C7B-4099-9731-0EDC268D96DE}" type="datetime8">
               <a:rPr lang="en-SE" smtClean="0"/>
-              <a:t>2022-12-07 13:46</a:t>
+              <a:t>12/08/2022 05:59</a:t>
             </a:fld>
             <a:endParaRPr lang="en-SE"/>
           </a:p>
@@ -1055,7 +1055,7 @@
           <a:p>
             <a:fld id="{53296F4E-E5DF-42B1-B8D9-2ABB22EC772C}" type="datetime8">
               <a:rPr lang="en-SE" smtClean="0"/>
-              <a:t>2022-12-07 13:46</a:t>
+              <a:t>12/08/2022 05:59</a:t>
             </a:fld>
             <a:endParaRPr lang="en-SE"/>
           </a:p>
@@ -1265,7 +1265,7 @@
           <a:p>
             <a:fld id="{C5874F66-CA25-47B2-9FC6-2BD39CC5F49A}" type="datetime8">
               <a:rPr lang="en-SE" smtClean="0"/>
-              <a:t>2022-12-07 13:46</a:t>
+              <a:t>12/08/2022 05:59</a:t>
             </a:fld>
             <a:endParaRPr lang="en-SE"/>
           </a:p>
@@ -1465,7 +1465,7 @@
           <a:p>
             <a:fld id="{EB5CF308-B19A-4331-A324-D479807E6DD4}" type="datetime8">
               <a:rPr lang="en-SE" smtClean="0"/>
-              <a:t>2022-12-07 13:46</a:t>
+              <a:t>12/08/2022 05:59</a:t>
             </a:fld>
             <a:endParaRPr lang="en-SE"/>
           </a:p>
@@ -1741,7 +1741,7 @@
           <a:p>
             <a:fld id="{06B0D6B3-DCD6-4A29-9991-0B0BADAC9DB5}" type="datetime8">
               <a:rPr lang="en-SE" smtClean="0"/>
-              <a:t>2022-12-07 13:46</a:t>
+              <a:t>12/08/2022 05:59</a:t>
             </a:fld>
             <a:endParaRPr lang="en-SE"/>
           </a:p>
@@ -2009,7 +2009,7 @@
           <a:p>
             <a:fld id="{CFEF5C23-B410-4BC4-92D6-C274BA31775A}" type="datetime8">
               <a:rPr lang="en-SE" smtClean="0"/>
-              <a:t>2022-12-07 13:46</a:t>
+              <a:t>12/08/2022 05:59</a:t>
             </a:fld>
             <a:endParaRPr lang="en-SE"/>
           </a:p>
@@ -2424,7 +2424,7 @@
           <a:p>
             <a:fld id="{B73C25E7-90CF-4631-9F8D-D8B9FDF980FA}" type="datetime8">
               <a:rPr lang="en-SE" smtClean="0"/>
-              <a:t>2022-12-07 13:46</a:t>
+              <a:t>12/08/2022 05:59</a:t>
             </a:fld>
             <a:endParaRPr lang="en-SE"/>
           </a:p>
@@ -2566,7 +2566,7 @@
           <a:p>
             <a:fld id="{CE8B7CBA-0EA8-4339-80D9-9348F7953AB3}" type="datetime8">
               <a:rPr lang="en-SE" smtClean="0"/>
-              <a:t>2022-12-07 13:46</a:t>
+              <a:t>12/08/2022 05:59</a:t>
             </a:fld>
             <a:endParaRPr lang="en-SE"/>
           </a:p>
@@ -2679,7 +2679,7 @@
           <a:p>
             <a:fld id="{DCED875E-B8F6-4B73-A075-12358B7B8F6F}" type="datetime8">
               <a:rPr lang="en-SE" smtClean="0"/>
-              <a:t>2022-12-07 13:46</a:t>
+              <a:t>12/08/2022 05:59</a:t>
             </a:fld>
             <a:endParaRPr lang="en-SE"/>
           </a:p>
@@ -2992,7 +2992,7 @@
           <a:p>
             <a:fld id="{32326FA4-D1D0-4C66-8A72-2405DCF288E2}" type="datetime8">
               <a:rPr lang="en-SE" smtClean="0"/>
-              <a:t>2022-12-07 13:46</a:t>
+              <a:t>12/08/2022 05:59</a:t>
             </a:fld>
             <a:endParaRPr lang="en-SE"/>
           </a:p>
@@ -3281,7 +3281,7 @@
           <a:p>
             <a:fld id="{294F4506-AC4C-4F33-BA91-8C62A291096C}" type="datetime8">
               <a:rPr lang="en-SE" smtClean="0"/>
-              <a:t>2022-12-07 13:46</a:t>
+              <a:t>12/08/2022 05:59</a:t>
             </a:fld>
             <a:endParaRPr lang="en-SE"/>
           </a:p>
@@ -3524,7 +3524,7 @@
           <a:p>
             <a:fld id="{9384FAA5-DECA-4FE9-9E6E-C89DA36DE384}" type="datetime8">
               <a:rPr lang="en-SE" smtClean="0"/>
-              <a:t>2022-12-07 13:46</a:t>
+              <a:t>12/08/2022 05:59</a:t>
             </a:fld>
             <a:endParaRPr lang="en-SE"/>
           </a:p>
@@ -5242,7 +5242,7 @@
           <a:p>
             <a:r>
               <a:rPr lang="en-US" dirty="0"/>
-              <a:t>Results </a:t>
+              <a:t>Evaluation </a:t>
             </a:r>
             <a:endParaRPr lang="en-SE" dirty="0"/>
           </a:p>
@@ -5266,7 +5266,9 @@
         </p:nvSpPr>
         <p:spPr/>
         <p:txBody>
-          <a:bodyPr/>
+          <a:bodyPr>
+            <a:normAutofit fontScale="92500" lnSpcReduction="20000"/>
+          </a:bodyPr>
           <a:lstStyle/>
           <a:p>
             <a:r>
@@ -5287,15 +5289,64 @@
             </a:r>
           </a:p>
           <a:p>
+            <a:pPr lvl="1"/>
+            <a:r>
+              <a:rPr lang="en-US" dirty="0"/>
+              <a:t>Yumi Prototype not exactly calibrated</a:t>
+            </a:r>
+          </a:p>
+          <a:p>
             <a:r>
               <a:rPr lang="en-US" dirty="0"/>
               <a:t>Scanning protocol </a:t>
             </a:r>
           </a:p>
           <a:p>
-            <a:r>
-              <a:rPr lang="en-US" dirty="0"/>
-              <a:t>Surface Reconstruction </a:t>
+            <a:pPr lvl="1"/>
+            <a:r>
+              <a:rPr lang="en-US" dirty="0"/>
+              <a:t>0 laser angle 20 spline 18deg , (time)</a:t>
+            </a:r>
+          </a:p>
+          <a:p>
+            <a:pPr lvl="1"/>
+            <a:r>
+              <a:rPr lang="en-US" dirty="0"/>
+              <a:t>10 laser angle 20 spline 18 deg , (time)</a:t>
+            </a:r>
+          </a:p>
+          <a:p>
+            <a:pPr lvl="1"/>
+            <a:r>
+              <a:rPr lang="en-US" dirty="0"/>
+              <a:t>0 laser angle 4 spline 90 deg ( time)</a:t>
+            </a:r>
+          </a:p>
+          <a:p>
+            <a:pPr lvl="1"/>
+            <a:r>
+              <a:rPr lang="en-US" dirty="0"/>
+              <a:t>10 laser angle 4 spline 90 deg (time)</a:t>
+            </a:r>
+          </a:p>
+          <a:p>
+            <a:pPr lvl="1"/>
+            <a:r>
+              <a:rPr lang="en-US" dirty="0"/>
+              <a:t>Second approach </a:t>
+            </a:r>
+          </a:p>
+          <a:p>
+            <a:r>
+              <a:rPr lang="en-US" dirty="0"/>
+              <a:t>Surface Reconstruction</a:t>
+            </a:r>
+          </a:p>
+          <a:p>
+            <a:pPr lvl="1"/>
+            <a:r>
+              <a:rPr lang="en-US" dirty="0"/>
+              <a:t>Different protocol plot ( time) </a:t>
             </a:r>
           </a:p>
           <a:p>

</xml_diff>